<commit_message>
Update files used, and regenerate thumbs and index
</commit_message>
<xml_diff>
--- a/assets/tactile_image_files/0004-continental_margin_subduction_zone/0004-continental_margin_subduction_zone.pptx
+++ b/assets/tactile_image_files/0004-continental_margin_subduction_zone/0004-continental_margin_subduction_zone.pptx
@@ -253,7 +253,7 @@
           <a:p>
             <a:fld id="{E796F801-3BB8-A247-923B-F07F1B58D38A}" type="datetimeFigureOut">
               <a:rPr lang="en-US" smtClean="0"/>
-              <a:t>7/23/20</a:t>
+              <a:t>1/8/21</a:t>
             </a:fld>
             <a:endParaRPr lang="en-US"/>
           </a:p>
@@ -433,7 +433,7 @@
           <a:p>
             <a:fld id="{E796F801-3BB8-A247-923B-F07F1B58D38A}" type="datetimeFigureOut">
               <a:rPr lang="en-US" smtClean="0"/>
-              <a:t>7/23/20</a:t>
+              <a:t>1/8/21</a:t>
             </a:fld>
             <a:endParaRPr lang="en-US"/>
           </a:p>
@@ -603,7 +603,7 @@
           <a:p>
             <a:fld id="{E796F801-3BB8-A247-923B-F07F1B58D38A}" type="datetimeFigureOut">
               <a:rPr lang="en-US" smtClean="0"/>
-              <a:t>7/23/20</a:t>
+              <a:t>1/8/21</a:t>
             </a:fld>
             <a:endParaRPr lang="en-US"/>
           </a:p>
@@ -847,7 +847,7 @@
           <a:p>
             <a:fld id="{E796F801-3BB8-A247-923B-F07F1B58D38A}" type="datetimeFigureOut">
               <a:rPr lang="en-US" smtClean="0"/>
-              <a:t>7/23/20</a:t>
+              <a:t>1/8/21</a:t>
             </a:fld>
             <a:endParaRPr lang="en-US"/>
           </a:p>
@@ -1079,7 +1079,7 @@
           <a:p>
             <a:fld id="{E796F801-3BB8-A247-923B-F07F1B58D38A}" type="datetimeFigureOut">
               <a:rPr lang="en-US" smtClean="0"/>
-              <a:t>7/23/20</a:t>
+              <a:t>1/8/21</a:t>
             </a:fld>
             <a:endParaRPr lang="en-US"/>
           </a:p>
@@ -1446,7 +1446,7 @@
           <a:p>
             <a:fld id="{E796F801-3BB8-A247-923B-F07F1B58D38A}" type="datetimeFigureOut">
               <a:rPr lang="en-US" smtClean="0"/>
-              <a:t>7/23/20</a:t>
+              <a:t>1/8/21</a:t>
             </a:fld>
             <a:endParaRPr lang="en-US"/>
           </a:p>
@@ -1564,7 +1564,7 @@
           <a:p>
             <a:fld id="{E796F801-3BB8-A247-923B-F07F1B58D38A}" type="datetimeFigureOut">
               <a:rPr lang="en-US" smtClean="0"/>
-              <a:t>7/23/20</a:t>
+              <a:t>1/8/21</a:t>
             </a:fld>
             <a:endParaRPr lang="en-US"/>
           </a:p>
@@ -1659,7 +1659,7 @@
           <a:p>
             <a:fld id="{E796F801-3BB8-A247-923B-F07F1B58D38A}" type="datetimeFigureOut">
               <a:rPr lang="en-US" smtClean="0"/>
-              <a:t>7/23/20</a:t>
+              <a:t>1/8/21</a:t>
             </a:fld>
             <a:endParaRPr lang="en-US"/>
           </a:p>
@@ -1936,7 +1936,7 @@
           <a:p>
             <a:fld id="{E796F801-3BB8-A247-923B-F07F1B58D38A}" type="datetimeFigureOut">
               <a:rPr lang="en-US" smtClean="0"/>
-              <a:t>7/23/20</a:t>
+              <a:t>1/8/21</a:t>
             </a:fld>
             <a:endParaRPr lang="en-US"/>
           </a:p>
@@ -2193,7 +2193,7 @@
           <a:p>
             <a:fld id="{E796F801-3BB8-A247-923B-F07F1B58D38A}" type="datetimeFigureOut">
               <a:rPr lang="en-US" smtClean="0"/>
-              <a:t>7/23/20</a:t>
+              <a:t>1/8/21</a:t>
             </a:fld>
             <a:endParaRPr lang="en-US"/>
           </a:p>
@@ -2406,7 +2406,7 @@
           <a:p>
             <a:fld id="{E796F801-3BB8-A247-923B-F07F1B58D38A}" type="datetimeFigureOut">
               <a:rPr lang="en-US" smtClean="0"/>
-              <a:t>7/23/20</a:t>
+              <a:t>1/8/21</a:t>
             </a:fld>
             <a:endParaRPr lang="en-US"/>
           </a:p>
@@ -3224,7 +3224,7 @@
                 <a:ea typeface="Helvetica" charset="0"/>
                 <a:cs typeface="Arial" panose="020B0604020202020204" pitchFamily="34" charset="0"/>
               </a:rPr>
-              <a:t>lithospheric mantle</a:t>
+              <a:t>lith. mantle</a:t>
             </a:r>
           </a:p>
         </p:txBody>
@@ -3257,7 +3257,7 @@
                 <a:ea typeface="Helvetica" charset="0"/>
                 <a:cs typeface="Arial" panose="020B0604020202020204" pitchFamily="34" charset="0"/>
               </a:rPr>
-              <a:t>asthenospheric mantle</a:t>
+              <a:t>asth. mantle</a:t>
             </a:r>
           </a:p>
         </p:txBody>
@@ -4345,50 +4345,6 @@
       </p:sp>
       <p:sp>
         <p:nvSpPr>
-          <p:cNvPr id="59" name="Rectangle 58">
-            <a:extLst>
-              <a:ext uri="{FF2B5EF4-FFF2-40B4-BE49-F238E27FC236}">
-                <a16:creationId xmlns:a16="http://schemas.microsoft.com/office/drawing/2014/main" id="{22F98437-114B-5346-981E-2FCEEFC40943}"/>
-              </a:ext>
-            </a:extLst>
-          </p:cNvPr>
-          <p:cNvSpPr/>
-          <p:nvPr/>
-        </p:nvSpPr>
-        <p:spPr>
-          <a:xfrm>
-            <a:off x="6566056" y="3669637"/>
-            <a:ext cx="2492883" cy="830997"/>
-          </a:xfrm>
-          <a:prstGeom prst="rect">
-            <a:avLst/>
-          </a:prstGeom>
-        </p:spPr>
-        <p:txBody>
-          <a:bodyPr wrap="square">
-            <a:spAutoFit/>
-          </a:bodyPr>
-          <a:lstStyle/>
-          <a:p>
-            <a:r>
-              <a:rPr lang="en-US" sz="2400">
-                <a:latin typeface="Swell Braille" pitchFamily="49"/>
-              </a:rPr>
-              <a:t>⠇⠊⠹⠕⠎⠏⠓⠻⠊⠉</a:t>
-            </a:r>
-          </a:p>
-          <a:p>
-            <a:r>
-              <a:rPr lang="en-US" sz="2400">
-                <a:latin typeface="Swell Braille" pitchFamily="49"/>
-              </a:rPr>
-              <a:t>⠍⠁⠝⠞⠇⠑</a:t>
-            </a:r>
-          </a:p>
-        </p:txBody>
-      </p:sp>
-      <p:sp>
-        <p:nvSpPr>
           <p:cNvPr id="60" name="Rectangle 59">
             <a:extLst>
               <a:ext uri="{FF2B5EF4-FFF2-40B4-BE49-F238E27FC236}">
@@ -4401,8 +4357,8 @@
         </p:nvSpPr>
         <p:spPr>
           <a:xfrm>
-            <a:off x="303529" y="5119208"/>
-            <a:ext cx="4162145" cy="461665"/>
+            <a:off x="303529" y="4715168"/>
+            <a:ext cx="5491215" cy="830997"/>
           </a:xfrm>
           <a:prstGeom prst="rect">
             <a:avLst/>
@@ -4418,7 +4374,15 @@
               <a:rPr lang="en-US" sz="2400">
                 <a:latin typeface="Swell Braille" pitchFamily="49"/>
               </a:rPr>
-              <a:t>⠁⠎⠮⠝⠕⠎⠏⠓⠻⠊⠉ ⠍⠁⠝⠞⠇⠑</a:t>
+              <a:t>⠁⠎⠞⠓⠑⠝⠕⠎⠏⠓⠑⠗⠊⠉⠀</a:t>
+            </a:r>
+          </a:p>
+          <a:p>
+            <a:r>
+              <a:rPr lang="en-US" sz="2400">
+                <a:latin typeface="Swell Braille" pitchFamily="49"/>
+              </a:rPr>
+              <a:t>⠍⠁⠝⠞⠇⠑</a:t>
             </a:r>
           </a:p>
         </p:txBody>
@@ -4438,7 +4402,7 @@
         <p:spPr>
           <a:xfrm>
             <a:off x="381452" y="3566856"/>
-            <a:ext cx="2492883" cy="830997"/>
+            <a:ext cx="4828501" cy="830997"/>
           </a:xfrm>
           <a:prstGeom prst="rect">
             <a:avLst/>
@@ -4454,56 +4418,10 @@
               <a:rPr lang="en-US" sz="2400">
                 <a:latin typeface="Swell Braille" pitchFamily="49"/>
               </a:rPr>
-              <a:t>⠇⠊⠹⠕⠎⠏⠓⠻⠊⠉</a:t>
-            </a:r>
-          </a:p>
-          <a:p>
-            <a:r>
-              <a:rPr lang="en-US" sz="2400">
-                <a:latin typeface="Swell Braille" pitchFamily="49"/>
-              </a:rPr>
-              <a:t>⠍⠁⠝⠞⠇⠑</a:t>
-            </a:r>
-          </a:p>
-        </p:txBody>
-      </p:sp>
-      <p:sp>
-        <p:nvSpPr>
-          <p:cNvPr id="62" name="Rectangle 61">
-            <a:extLst>
-              <a:ext uri="{FF2B5EF4-FFF2-40B4-BE49-F238E27FC236}">
-                <a16:creationId xmlns:a16="http://schemas.microsoft.com/office/drawing/2014/main" id="{1B333757-8AAD-4448-9F73-2AFAAC500BA0}"/>
-              </a:ext>
-            </a:extLst>
-          </p:cNvPr>
-          <p:cNvSpPr/>
-          <p:nvPr/>
-        </p:nvSpPr>
-        <p:spPr>
-          <a:xfrm>
-            <a:off x="6222321" y="4708082"/>
-            <a:ext cx="2783455" cy="830997"/>
-          </a:xfrm>
-          <a:prstGeom prst="rect">
-            <a:avLst/>
-          </a:prstGeom>
-        </p:spPr>
-        <p:txBody>
-          <a:bodyPr wrap="square">
-            <a:spAutoFit/>
-          </a:bodyPr>
-          <a:lstStyle/>
-          <a:p>
-            <a:pPr algn="ctr"/>
-            <a:r>
-              <a:rPr lang="en-US" sz="2400">
-                <a:latin typeface="Swell Braille" pitchFamily="49"/>
-              </a:rPr>
-              <a:t>⠁⠎⠮⠝⠕⠎⠏⠓⠻⠊⠉</a:t>
-            </a:r>
-          </a:p>
-          <a:p>
-            <a:pPr algn="ctr"/>
+              <a:t>⠇⠊⠞⠓⠕⠎⠏⠓⠑⠗⠊⠉⠀</a:t>
+            </a:r>
+          </a:p>
+          <a:p>
             <a:r>
               <a:rPr lang="en-US" sz="2400">
                 <a:latin typeface="Swell Braille" pitchFamily="49"/>
@@ -4666,6 +4584,86 @@
           <a:p>
             <a:pPr algn="ctr"/>
             <a:endParaRPr lang="en-US"/>
+          </a:p>
+        </p:txBody>
+      </p:sp>
+      <p:sp>
+        <p:nvSpPr>
+          <p:cNvPr id="2" name="Rectangle 1">
+            <a:extLst>
+              <a:ext uri="{FF2B5EF4-FFF2-40B4-BE49-F238E27FC236}">
+                <a16:creationId xmlns:a16="http://schemas.microsoft.com/office/drawing/2014/main" id="{CEB6DDB8-7A9C-2447-B625-2DAC96E5D626}"/>
+              </a:ext>
+            </a:extLst>
+          </p:cNvPr>
+          <p:cNvSpPr/>
+          <p:nvPr/>
+        </p:nvSpPr>
+        <p:spPr>
+          <a:xfrm>
+            <a:off x="7014049" y="3680269"/>
+            <a:ext cx="1521570" cy="830997"/>
+          </a:xfrm>
+          <a:prstGeom prst="rect">
+            <a:avLst/>
+          </a:prstGeom>
+        </p:spPr>
+        <p:txBody>
+          <a:bodyPr wrap="none">
+            <a:spAutoFit/>
+          </a:bodyPr>
+          <a:lstStyle/>
+          <a:p>
+            <a:r>
+              <a:rPr lang="en-US" sz="2400">
+                <a:latin typeface="Swell Braille" pitchFamily="49"/>
+              </a:rPr>
+              <a:t>⠇⠊⠞⠓⠲⠀</a:t>
+            </a:r>
+          </a:p>
+          <a:p>
+            <a:r>
+              <a:rPr lang="en-US" sz="2400">
+                <a:latin typeface="Swell Braille" pitchFamily="49"/>
+              </a:rPr>
+              <a:t>⠍⠁⠝⠞⠇⠑</a:t>
+            </a:r>
+          </a:p>
+        </p:txBody>
+      </p:sp>
+      <p:sp>
+        <p:nvSpPr>
+          <p:cNvPr id="3" name="Rectangle 2">
+            <a:extLst>
+              <a:ext uri="{FF2B5EF4-FFF2-40B4-BE49-F238E27FC236}">
+                <a16:creationId xmlns:a16="http://schemas.microsoft.com/office/drawing/2014/main" id="{0D4EEAFA-B9C1-724A-B0A3-D84ADBCF60B5}"/>
+              </a:ext>
+            </a:extLst>
+          </p:cNvPr>
+          <p:cNvSpPr/>
+          <p:nvPr/>
+        </p:nvSpPr>
+        <p:spPr>
+          <a:xfrm>
+            <a:off x="6138371" y="4807320"/>
+            <a:ext cx="2941831" cy="461665"/>
+          </a:xfrm>
+          <a:prstGeom prst="rect">
+            <a:avLst/>
+          </a:prstGeom>
+        </p:spPr>
+        <p:txBody>
+          <a:bodyPr wrap="none">
+            <a:spAutoFit/>
+          </a:bodyPr>
+          <a:lstStyle/>
+          <a:p>
+            <a:r>
+              <a:rPr lang="en-US" sz="2400">
+                <a:latin typeface="Swell Braille" pitchFamily="49"/>
+              </a:rPr>
+              <a:t>⠁⠎⠞⠓⠲⠀⠍⠁⠝⠞⠇⠑</a:t>
+            </a:r>
           </a:p>
         </p:txBody>
       </p:sp>

</xml_diff>